<commit_message>
First submission of HW2
</commit_message>
<xml_diff>
--- a/Slides 8_29.pptx
+++ b/Slides 8_29.pptx
@@ -221,7 +221,7 @@
           <a:p>
             <a:fld id="{56C34DE2-C2CF-5C4F-B16B-6761862E47DF}" type="datetimeFigureOut">
               <a:rPr lang="en-US" smtClean="0"/>
-              <a:t>8/29/18</a:t>
+              <a:t>9/5/18</a:t>
             </a:fld>
             <a:endParaRPr lang="en-US"/>
           </a:p>
@@ -797,6 +797,453 @@
 </p:notes>
 </file>
 
+<file path=ppt/notesSlides/notesSlide4.xml><?xml version="1.0" encoding="utf-8"?>
+<p:notes xmlns:a="http://schemas.openxmlformats.org/drawingml/2006/main" xmlns:r="http://schemas.openxmlformats.org/officeDocument/2006/relationships" xmlns:p="http://schemas.openxmlformats.org/presentationml/2006/main">
+  <p:cSld>
+    <p:spTree>
+      <p:nvGrpSpPr>
+        <p:cNvPr id="1" name=""/>
+        <p:cNvGrpSpPr/>
+        <p:nvPr/>
+      </p:nvGrpSpPr>
+      <p:grpSpPr>
+        <a:xfrm>
+          <a:off x="0" y="0"/>
+          <a:ext cx="0" cy="0"/>
+          <a:chOff x="0" y="0"/>
+          <a:chExt cx="0" cy="0"/>
+        </a:xfrm>
+      </p:grpSpPr>
+      <p:sp>
+        <p:nvSpPr>
+          <p:cNvPr id="2" name="Slide Image Placeholder 1"/>
+          <p:cNvSpPr>
+            <a:spLocks noGrp="1" noRot="1" noChangeAspect="1"/>
+          </p:cNvSpPr>
+          <p:nvPr>
+            <p:ph type="sldImg"/>
+          </p:nvPr>
+        </p:nvSpPr>
+        <p:spPr/>
+      </p:sp>
+      <p:sp>
+        <p:nvSpPr>
+          <p:cNvPr id="3" name="Notes Placeholder 2"/>
+          <p:cNvSpPr>
+            <a:spLocks noGrp="1"/>
+          </p:cNvSpPr>
+          <p:nvPr>
+            <p:ph type="body" idx="1"/>
+          </p:nvPr>
+        </p:nvSpPr>
+        <p:spPr/>
+        <p:txBody>
+          <a:bodyPr/>
+          <a:lstStyle/>
+          <a:p>
+            <a:endParaRPr lang="en-US" dirty="0"/>
+          </a:p>
+        </p:txBody>
+      </p:sp>
+      <p:sp>
+        <p:nvSpPr>
+          <p:cNvPr id="4" name="Slide Number Placeholder 3"/>
+          <p:cNvSpPr>
+            <a:spLocks noGrp="1"/>
+          </p:cNvSpPr>
+          <p:nvPr>
+            <p:ph type="sldNum" sz="quarter" idx="10"/>
+          </p:nvPr>
+        </p:nvSpPr>
+        <p:spPr/>
+        <p:txBody>
+          <a:bodyPr/>
+          <a:lstStyle/>
+          <a:p>
+            <a:fld id="{02324472-D3A7-2845-8995-7A7DC8F3CD21}" type="slidenum">
+              <a:rPr lang="en-US" smtClean="0"/>
+              <a:t>9</a:t>
+            </a:fld>
+            <a:endParaRPr lang="en-US"/>
+          </a:p>
+        </p:txBody>
+      </p:sp>
+    </p:spTree>
+    <p:extLst>
+      <p:ext uri="{BB962C8B-B14F-4D97-AF65-F5344CB8AC3E}">
+        <p14:creationId xmlns:p14="http://schemas.microsoft.com/office/powerpoint/2010/main" val="2031336193"/>
+      </p:ext>
+    </p:extLst>
+  </p:cSld>
+  <p:clrMapOvr>
+    <a:masterClrMapping/>
+  </p:clrMapOvr>
+</p:notes>
+</file>
+
+<file path=ppt/notesSlides/notesSlide5.xml><?xml version="1.0" encoding="utf-8"?>
+<p:notes xmlns:a="http://schemas.openxmlformats.org/drawingml/2006/main" xmlns:r="http://schemas.openxmlformats.org/officeDocument/2006/relationships" xmlns:p="http://schemas.openxmlformats.org/presentationml/2006/main">
+  <p:cSld>
+    <p:spTree>
+      <p:nvGrpSpPr>
+        <p:cNvPr id="1" name=""/>
+        <p:cNvGrpSpPr/>
+        <p:nvPr/>
+      </p:nvGrpSpPr>
+      <p:grpSpPr>
+        <a:xfrm>
+          <a:off x="0" y="0"/>
+          <a:ext cx="0" cy="0"/>
+          <a:chOff x="0" y="0"/>
+          <a:chExt cx="0" cy="0"/>
+        </a:xfrm>
+      </p:grpSpPr>
+      <p:sp>
+        <p:nvSpPr>
+          <p:cNvPr id="2" name="Slide Image Placeholder 1"/>
+          <p:cNvSpPr>
+            <a:spLocks noGrp="1" noRot="1" noChangeAspect="1"/>
+          </p:cNvSpPr>
+          <p:nvPr>
+            <p:ph type="sldImg"/>
+          </p:nvPr>
+        </p:nvSpPr>
+        <p:spPr/>
+      </p:sp>
+      <p:sp>
+        <p:nvSpPr>
+          <p:cNvPr id="3" name="Notes Placeholder 2"/>
+          <p:cNvSpPr>
+            <a:spLocks noGrp="1"/>
+          </p:cNvSpPr>
+          <p:nvPr>
+            <p:ph type="body" idx="1"/>
+          </p:nvPr>
+        </p:nvSpPr>
+        <p:spPr/>
+        <p:txBody>
+          <a:bodyPr/>
+          <a:lstStyle/>
+          <a:p>
+            <a:r>
+              <a:rPr lang="en-US" dirty="0" smtClean="0"/>
+              <a:t>Lower layers are closer to the hardware, higher layers are</a:t>
+            </a:r>
+            <a:r>
+              <a:rPr lang="en-US" baseline="0" dirty="0" smtClean="0"/>
+              <a:t> closer to the user. The lowest ones are like the parent interfaces.</a:t>
+            </a:r>
+            <a:br>
+              <a:rPr lang="en-US" baseline="0" dirty="0" smtClean="0"/>
+            </a:br>
+            <a:r>
+              <a:rPr lang="en-US" baseline="0" dirty="0" smtClean="0"/>
+              <a:t>These layers are solely about where the protocols belong.</a:t>
+            </a:r>
+            <a:endParaRPr lang="en-US" dirty="0"/>
+          </a:p>
+        </p:txBody>
+      </p:sp>
+      <p:sp>
+        <p:nvSpPr>
+          <p:cNvPr id="4" name="Slide Number Placeholder 3"/>
+          <p:cNvSpPr>
+            <a:spLocks noGrp="1"/>
+          </p:cNvSpPr>
+          <p:nvPr>
+            <p:ph type="sldNum" sz="quarter" idx="10"/>
+          </p:nvPr>
+        </p:nvSpPr>
+        <p:spPr/>
+        <p:txBody>
+          <a:bodyPr/>
+          <a:lstStyle/>
+          <a:p>
+            <a:fld id="{02324472-D3A7-2845-8995-7A7DC8F3CD21}" type="slidenum">
+              <a:rPr lang="en-US" smtClean="0"/>
+              <a:t>10</a:t>
+            </a:fld>
+            <a:endParaRPr lang="en-US"/>
+          </a:p>
+        </p:txBody>
+      </p:sp>
+    </p:spTree>
+    <p:extLst>
+      <p:ext uri="{BB962C8B-B14F-4D97-AF65-F5344CB8AC3E}">
+        <p14:creationId xmlns:p14="http://schemas.microsoft.com/office/powerpoint/2010/main" val="1687407113"/>
+      </p:ext>
+    </p:extLst>
+  </p:cSld>
+  <p:clrMapOvr>
+    <a:masterClrMapping/>
+  </p:clrMapOvr>
+</p:notes>
+</file>
+
+<file path=ppt/notesSlides/notesSlide6.xml><?xml version="1.0" encoding="utf-8"?>
+<p:notes xmlns:a="http://schemas.openxmlformats.org/drawingml/2006/main" xmlns:r="http://schemas.openxmlformats.org/officeDocument/2006/relationships" xmlns:p="http://schemas.openxmlformats.org/presentationml/2006/main">
+  <p:cSld>
+    <p:spTree>
+      <p:nvGrpSpPr>
+        <p:cNvPr id="1" name=""/>
+        <p:cNvGrpSpPr/>
+        <p:nvPr/>
+      </p:nvGrpSpPr>
+      <p:grpSpPr>
+        <a:xfrm>
+          <a:off x="0" y="0"/>
+          <a:ext cx="0" cy="0"/>
+          <a:chOff x="0" y="0"/>
+          <a:chExt cx="0" cy="0"/>
+        </a:xfrm>
+      </p:grpSpPr>
+      <p:sp>
+        <p:nvSpPr>
+          <p:cNvPr id="2" name="Slide Image Placeholder 1"/>
+          <p:cNvSpPr>
+            <a:spLocks noGrp="1" noRot="1" noChangeAspect="1"/>
+          </p:cNvSpPr>
+          <p:nvPr>
+            <p:ph type="sldImg"/>
+          </p:nvPr>
+        </p:nvSpPr>
+        <p:spPr/>
+      </p:sp>
+      <p:sp>
+        <p:nvSpPr>
+          <p:cNvPr id="3" name="Notes Placeholder 2"/>
+          <p:cNvSpPr>
+            <a:spLocks noGrp="1"/>
+          </p:cNvSpPr>
+          <p:nvPr>
+            <p:ph type="body" idx="1"/>
+          </p:nvPr>
+        </p:nvSpPr>
+        <p:spPr/>
+        <p:txBody>
+          <a:bodyPr/>
+          <a:lstStyle/>
+          <a:p>
+            <a:r>
+              <a:rPr lang="en-US" dirty="0" smtClean="0"/>
+              <a:t>Some tings don’t have all the layers. Routers,</a:t>
+            </a:r>
+            <a:r>
+              <a:rPr lang="en-US" baseline="0" dirty="0" smtClean="0"/>
+              <a:t> for example, only have up to the network layer, so they have no idea what TCP, UDP, SMTP, or HTTP is.</a:t>
+            </a:r>
+            <a:endParaRPr lang="en-US" dirty="0"/>
+          </a:p>
+        </p:txBody>
+      </p:sp>
+      <p:sp>
+        <p:nvSpPr>
+          <p:cNvPr id="4" name="Slide Number Placeholder 3"/>
+          <p:cNvSpPr>
+            <a:spLocks noGrp="1"/>
+          </p:cNvSpPr>
+          <p:nvPr>
+            <p:ph type="sldNum" sz="quarter" idx="10"/>
+          </p:nvPr>
+        </p:nvSpPr>
+        <p:spPr/>
+        <p:txBody>
+          <a:bodyPr/>
+          <a:lstStyle/>
+          <a:p>
+            <a:fld id="{02324472-D3A7-2845-8995-7A7DC8F3CD21}" type="slidenum">
+              <a:rPr lang="en-US" smtClean="0"/>
+              <a:t>11</a:t>
+            </a:fld>
+            <a:endParaRPr lang="en-US"/>
+          </a:p>
+        </p:txBody>
+      </p:sp>
+    </p:spTree>
+    <p:extLst>
+      <p:ext uri="{BB962C8B-B14F-4D97-AF65-F5344CB8AC3E}">
+        <p14:creationId xmlns:p14="http://schemas.microsoft.com/office/powerpoint/2010/main" val="604456764"/>
+      </p:ext>
+    </p:extLst>
+  </p:cSld>
+  <p:clrMapOvr>
+    <a:masterClrMapping/>
+  </p:clrMapOvr>
+</p:notes>
+</file>
+
+<file path=ppt/notesSlides/notesSlide7.xml><?xml version="1.0" encoding="utf-8"?>
+<p:notes xmlns:a="http://schemas.openxmlformats.org/drawingml/2006/main" xmlns:r="http://schemas.openxmlformats.org/officeDocument/2006/relationships" xmlns:p="http://schemas.openxmlformats.org/presentationml/2006/main">
+  <p:cSld>
+    <p:spTree>
+      <p:nvGrpSpPr>
+        <p:cNvPr id="1" name=""/>
+        <p:cNvGrpSpPr/>
+        <p:nvPr/>
+      </p:nvGrpSpPr>
+      <p:grpSpPr>
+        <a:xfrm>
+          <a:off x="0" y="0"/>
+          <a:ext cx="0" cy="0"/>
+          <a:chOff x="0" y="0"/>
+          <a:chExt cx="0" cy="0"/>
+        </a:xfrm>
+      </p:grpSpPr>
+      <p:sp>
+        <p:nvSpPr>
+          <p:cNvPr id="2" name="Slide Image Placeholder 1"/>
+          <p:cNvSpPr>
+            <a:spLocks noGrp="1" noRot="1" noChangeAspect="1"/>
+          </p:cNvSpPr>
+          <p:nvPr>
+            <p:ph type="sldImg"/>
+          </p:nvPr>
+        </p:nvSpPr>
+        <p:spPr/>
+      </p:sp>
+      <p:sp>
+        <p:nvSpPr>
+          <p:cNvPr id="3" name="Notes Placeholder 2"/>
+          <p:cNvSpPr>
+            <a:spLocks noGrp="1"/>
+          </p:cNvSpPr>
+          <p:nvPr>
+            <p:ph type="body" idx="1"/>
+          </p:nvPr>
+        </p:nvSpPr>
+        <p:spPr/>
+        <p:txBody>
+          <a:bodyPr/>
+          <a:lstStyle/>
+          <a:p>
+            <a:endParaRPr lang="en-US" dirty="0"/>
+          </a:p>
+        </p:txBody>
+      </p:sp>
+      <p:sp>
+        <p:nvSpPr>
+          <p:cNvPr id="4" name="Slide Number Placeholder 3"/>
+          <p:cNvSpPr>
+            <a:spLocks noGrp="1"/>
+          </p:cNvSpPr>
+          <p:nvPr>
+            <p:ph type="sldNum" sz="quarter" idx="10"/>
+          </p:nvPr>
+        </p:nvSpPr>
+        <p:spPr/>
+        <p:txBody>
+          <a:bodyPr/>
+          <a:lstStyle/>
+          <a:p>
+            <a:fld id="{02324472-D3A7-2845-8995-7A7DC8F3CD21}" type="slidenum">
+              <a:rPr lang="en-US" smtClean="0"/>
+              <a:t>12</a:t>
+            </a:fld>
+            <a:endParaRPr lang="en-US"/>
+          </a:p>
+        </p:txBody>
+      </p:sp>
+    </p:spTree>
+    <p:extLst>
+      <p:ext uri="{BB962C8B-B14F-4D97-AF65-F5344CB8AC3E}">
+        <p14:creationId xmlns:p14="http://schemas.microsoft.com/office/powerpoint/2010/main" val="139707732"/>
+      </p:ext>
+    </p:extLst>
+  </p:cSld>
+  <p:clrMapOvr>
+    <a:masterClrMapping/>
+  </p:clrMapOvr>
+</p:notes>
+</file>
+
+<file path=ppt/notesSlides/notesSlide8.xml><?xml version="1.0" encoding="utf-8"?>
+<p:notes xmlns:a="http://schemas.openxmlformats.org/drawingml/2006/main" xmlns:r="http://schemas.openxmlformats.org/officeDocument/2006/relationships" xmlns:p="http://schemas.openxmlformats.org/presentationml/2006/main">
+  <p:cSld>
+    <p:spTree>
+      <p:nvGrpSpPr>
+        <p:cNvPr id="1" name=""/>
+        <p:cNvGrpSpPr/>
+        <p:nvPr/>
+      </p:nvGrpSpPr>
+      <p:grpSpPr>
+        <a:xfrm>
+          <a:off x="0" y="0"/>
+          <a:ext cx="0" cy="0"/>
+          <a:chOff x="0" y="0"/>
+          <a:chExt cx="0" cy="0"/>
+        </a:xfrm>
+      </p:grpSpPr>
+      <p:sp>
+        <p:nvSpPr>
+          <p:cNvPr id="2" name="Slide Image Placeholder 1"/>
+          <p:cNvSpPr>
+            <a:spLocks noGrp="1" noRot="1" noChangeAspect="1"/>
+          </p:cNvSpPr>
+          <p:nvPr>
+            <p:ph type="sldImg"/>
+          </p:nvPr>
+        </p:nvSpPr>
+        <p:spPr/>
+      </p:sp>
+      <p:sp>
+        <p:nvSpPr>
+          <p:cNvPr id="3" name="Notes Placeholder 2"/>
+          <p:cNvSpPr>
+            <a:spLocks noGrp="1"/>
+          </p:cNvSpPr>
+          <p:nvPr>
+            <p:ph type="body" idx="1"/>
+          </p:nvPr>
+        </p:nvSpPr>
+        <p:spPr/>
+        <p:txBody>
+          <a:bodyPr/>
+          <a:lstStyle/>
+          <a:p>
+            <a:r>
+              <a:rPr lang="en-US" dirty="0" smtClean="0"/>
+              <a:t>H stands for header, m is for message</a:t>
+            </a:r>
+            <a:endParaRPr lang="en-US" dirty="0"/>
+          </a:p>
+        </p:txBody>
+      </p:sp>
+      <p:sp>
+        <p:nvSpPr>
+          <p:cNvPr id="4" name="Slide Number Placeholder 3"/>
+          <p:cNvSpPr>
+            <a:spLocks noGrp="1"/>
+          </p:cNvSpPr>
+          <p:nvPr>
+            <p:ph type="sldNum" sz="quarter" idx="10"/>
+          </p:nvPr>
+        </p:nvSpPr>
+        <p:spPr/>
+        <p:txBody>
+          <a:bodyPr/>
+          <a:lstStyle/>
+          <a:p>
+            <a:fld id="{02324472-D3A7-2845-8995-7A7DC8F3CD21}" type="slidenum">
+              <a:rPr lang="en-US" smtClean="0"/>
+              <a:t>13</a:t>
+            </a:fld>
+            <a:endParaRPr lang="en-US"/>
+          </a:p>
+        </p:txBody>
+      </p:sp>
+    </p:spTree>
+    <p:extLst>
+      <p:ext uri="{BB962C8B-B14F-4D97-AF65-F5344CB8AC3E}">
+        <p14:creationId xmlns:p14="http://schemas.microsoft.com/office/powerpoint/2010/main" val="462105516"/>
+      </p:ext>
+    </p:extLst>
+  </p:cSld>
+  <p:clrMapOvr>
+    <a:masterClrMapping/>
+  </p:clrMapOvr>
+</p:notes>
+</file>
+
 <file path=ppt/slideLayouts/slideLayout1.xml><?xml version="1.0" encoding="utf-8"?>
 <p:sldLayout xmlns:a="http://schemas.openxmlformats.org/drawingml/2006/main" xmlns:r="http://schemas.openxmlformats.org/officeDocument/2006/relationships" xmlns:p="http://schemas.openxmlformats.org/presentationml/2006/main" type="tx">
   <p:cSld>
@@ -906,7 +1353,7 @@
           <a:p>
             <a:fld id="{C16525B2-4347-4F72-BAF7-76B19438D329}" type="datetimeFigureOut">
               <a:rPr lang="en-US" smtClean="0"/>
-              <a:t>8/29/18</a:t>
+              <a:t>9/5/18</a:t>
             </a:fld>
             <a:endParaRPr lang="en-US"/>
           </a:p>
@@ -1129,7 +1576,7 @@
           <a:p>
             <a:fld id="{1D8BD707-D9CF-40AE-B4C6-C98DA3205C09}" type="datetimeFigureOut">
               <a:rPr lang="en-US"/>
-              <a:t>8/29/18</a:t>
+              <a:t>9/5/18</a:t>
             </a:fld>
             <a:endParaRPr lang="en-US"/>
           </a:p>
@@ -2299,7 +2746,7 @@
             <a:avLst/>
           </a:prstGeom>
           <a:blipFill>
-            <a:blip r:embed="rId2" cstate="print"/>
+            <a:blip r:embed="rId3" cstate="print"/>
             <a:stretch>
               <a:fillRect/>
             </a:stretch>
@@ -2330,7 +2777,7 @@
             <a:avLst/>
           </a:prstGeom>
           <a:blipFill>
-            <a:blip r:embed="rId3" cstate="print"/>
+            <a:blip r:embed="rId4" cstate="print"/>
             <a:stretch>
               <a:fillRect/>
             </a:stretch>
@@ -2361,7 +2808,7 @@
             <a:avLst/>
           </a:prstGeom>
           <a:blipFill>
-            <a:blip r:embed="rId4" cstate="print"/>
+            <a:blip r:embed="rId5" cstate="print"/>
             <a:stretch>
               <a:fillRect/>
             </a:stretch>
@@ -3259,7 +3706,7 @@
             <a:avLst/>
           </a:prstGeom>
           <a:blipFill>
-            <a:blip r:embed="rId2" cstate="print"/>
+            <a:blip r:embed="rId3" cstate="print"/>
             <a:stretch>
               <a:fillRect/>
             </a:stretch>
@@ -3290,7 +3737,7 @@
             <a:avLst/>
           </a:prstGeom>
           <a:blipFill>
-            <a:blip r:embed="rId3" cstate="print"/>
+            <a:blip r:embed="rId4" cstate="print"/>
             <a:stretch>
               <a:fillRect/>
             </a:stretch>
@@ -3321,7 +3768,7 @@
             <a:avLst/>
           </a:prstGeom>
           <a:blipFill>
-            <a:blip r:embed="rId4" cstate="print"/>
+            <a:blip r:embed="rId5" cstate="print"/>
             <a:stretch>
               <a:fillRect/>
             </a:stretch>
@@ -4219,7 +4666,7 @@
             <a:avLst/>
           </a:prstGeom>
           <a:blipFill>
-            <a:blip r:embed="rId2" cstate="print"/>
+            <a:blip r:embed="rId3" cstate="print"/>
             <a:stretch>
               <a:fillRect/>
             </a:stretch>
@@ -4250,7 +4697,7 @@
             <a:avLst/>
           </a:prstGeom>
           <a:blipFill>
-            <a:blip r:embed="rId3" cstate="print"/>
+            <a:blip r:embed="rId4" cstate="print"/>
             <a:stretch>
               <a:fillRect/>
             </a:stretch>
@@ -4281,7 +4728,7 @@
             <a:avLst/>
           </a:prstGeom>
           <a:blipFill>
-            <a:blip r:embed="rId4" cstate="print"/>
+            <a:blip r:embed="rId5" cstate="print"/>
             <a:stretch>
               <a:fillRect/>
             </a:stretch>
@@ -5179,7 +5626,7 @@
             <a:avLst/>
           </a:prstGeom>
           <a:blipFill>
-            <a:blip r:embed="rId2" cstate="print"/>
+            <a:blip r:embed="rId3" cstate="print"/>
             <a:stretch>
               <a:fillRect/>
             </a:stretch>
@@ -5210,7 +5657,7 @@
             <a:avLst/>
           </a:prstGeom>
           <a:blipFill>
-            <a:blip r:embed="rId3" cstate="print"/>
+            <a:blip r:embed="rId4" cstate="print"/>
             <a:stretch>
               <a:fillRect/>
             </a:stretch>
@@ -5241,7 +5688,7 @@
             <a:avLst/>
           </a:prstGeom>
           <a:blipFill>
-            <a:blip r:embed="rId4" cstate="print"/>
+            <a:blip r:embed="rId5" cstate="print"/>
             <a:stretch>
               <a:fillRect/>
             </a:stretch>
@@ -13759,7 +14206,7 @@
             <a:avLst/>
           </a:prstGeom>
           <a:blipFill>
-            <a:blip r:embed="rId2" cstate="print"/>
+            <a:blip r:embed="rId3" cstate="print"/>
             <a:stretch>
               <a:fillRect/>
             </a:stretch>
@@ -13790,7 +14237,7 @@
             <a:avLst/>
           </a:prstGeom>
           <a:blipFill>
-            <a:blip r:embed="rId3" cstate="print"/>
+            <a:blip r:embed="rId4" cstate="print"/>
             <a:stretch>
               <a:fillRect/>
             </a:stretch>
@@ -13821,7 +14268,7 @@
             <a:avLst/>
           </a:prstGeom>
           <a:blipFill>
-            <a:blip r:embed="rId4" cstate="print"/>
+            <a:blip r:embed="rId5" cstate="print"/>
             <a:stretch>
               <a:fillRect/>
             </a:stretch>

</xml_diff>